<commit_message>
what to track in lists
</commit_message>
<xml_diff>
--- a/Combo Menu with lists using python.pptx
+++ b/Combo Menu with lists using python.pptx
@@ -5,15 +5,16 @@
     <p:sldMasterId id="2147483648" r:id="rId4"/>
   </p:sldMasterIdLst>
   <p:notesMasterIdLst>
-    <p:notesMasterId r:id="rId8"/>
+    <p:notesMasterId r:id="rId9"/>
   </p:notesMasterIdLst>
   <p:handoutMasterIdLst>
-    <p:handoutMasterId r:id="rId9"/>
+    <p:handoutMasterId r:id="rId10"/>
   </p:handoutMasterIdLst>
   <p:sldIdLst>
     <p:sldId id="256" r:id="rId5"/>
     <p:sldId id="3849" r:id="rId6"/>
     <p:sldId id="3850" r:id="rId7"/>
+    <p:sldId id="3851" r:id="rId8"/>
   </p:sldIdLst>
   <p:sldSz cx="12192000" cy="6858000"/>
   <p:notesSz cx="6858000" cy="9144000"/>
@@ -10294,7 +10295,7 @@
           <a:p>
             <a:r>
               <a:rPr lang="en-US" dirty="0"/>
-              <a:t>Agenda</a:t>
+              <a:t>Design Considerations</a:t>
             </a:r>
           </a:p>
         </p:txBody>
@@ -10330,7 +10331,7 @@
           <a:p>
             <a:r>
               <a:rPr lang="en-US" dirty="0"/>
-              <a:t>Introduction</a:t>
+              <a:t>Overall Goal</a:t>
             </a:r>
           </a:p>
           <a:p>
@@ -10412,7 +10413,7 @@
           <a:p>
             <a:r>
               <a:rPr lang="en-US" dirty="0"/>
-              <a:t>Introduction</a:t>
+              <a:t>Overall Goal</a:t>
             </a:r>
           </a:p>
         </p:txBody>
@@ -10461,11 +10462,16 @@
             </a:pPr>
             <a:r>
               <a:rPr lang="en-US" dirty="0"/>
-              <a:t>Check for and apply discount </a:t>
+              <a:t>Check for and apply discount for 3-item combination order</a:t>
             </a:r>
+          </a:p>
+          <a:p>
+            <a:pPr marL="457200" indent="-457200">
+              <a:buAutoNum type="arabicPeriod"/>
+            </a:pPr>
             <a:r>
-              <a:rPr lang="en-US"/>
-              <a:t>for 3-item combination order</a:t>
+              <a:rPr lang="en-US" dirty="0"/>
+              <a:t>Display details of the order, including type/size, price, any discount and final total</a:t>
             </a:r>
           </a:p>
         </p:txBody>
@@ -10474,6 +10480,142 @@
     <p:extLst>
       <p:ext uri="{BB962C8B-B14F-4D97-AF65-F5344CB8AC3E}">
         <p14:creationId xmlns:p14="http://schemas.microsoft.com/office/powerpoint/2010/main" val="3090151877"/>
+      </p:ext>
+    </p:extLst>
+  </p:cSld>
+  <p:clrMapOvr>
+    <a:masterClrMapping/>
+  </p:clrMapOvr>
+</p:sld>
+</file>
+
+<file path=ppt/slides/slide4.xml><?xml version="1.0" encoding="utf-8"?>
+<p:sld xmlns:a="http://schemas.openxmlformats.org/drawingml/2006/main" xmlns:r="http://schemas.openxmlformats.org/officeDocument/2006/relationships" xmlns:p="http://schemas.openxmlformats.org/presentationml/2006/main">
+  <p:cSld>
+    <p:spTree>
+      <p:nvGrpSpPr>
+        <p:cNvPr id="1" name="">
+          <a:extLst>
+            <a:ext uri="{FF2B5EF4-FFF2-40B4-BE49-F238E27FC236}">
+              <a16:creationId xmlns:a16="http://schemas.microsoft.com/office/drawing/2014/main" id="{D7BE20F0-A515-1CE2-413A-E752D3598951}"/>
+            </a:ext>
+          </a:extLst>
+        </p:cNvPr>
+        <p:cNvGrpSpPr/>
+        <p:nvPr/>
+      </p:nvGrpSpPr>
+      <p:grpSpPr>
+        <a:xfrm>
+          <a:off x="0" y="0"/>
+          <a:ext cx="0" cy="0"/>
+          <a:chOff x="0" y="0"/>
+          <a:chExt cx="0" cy="0"/>
+        </a:xfrm>
+      </p:grpSpPr>
+      <p:sp>
+        <p:nvSpPr>
+          <p:cNvPr id="2" name="Title 1">
+            <a:extLst>
+              <a:ext uri="{FF2B5EF4-FFF2-40B4-BE49-F238E27FC236}">
+                <a16:creationId xmlns:a16="http://schemas.microsoft.com/office/drawing/2014/main" id="{22F3B648-5DC3-10B6-132A-03FCA5A707A3}"/>
+              </a:ext>
+            </a:extLst>
+          </p:cNvPr>
+          <p:cNvSpPr>
+            <a:spLocks noGrp="1"/>
+          </p:cNvSpPr>
+          <p:nvPr>
+            <p:ph type="title"/>
+          </p:nvPr>
+        </p:nvSpPr>
+        <p:spPr/>
+        <p:txBody>
+          <a:bodyPr/>
+          <a:lstStyle/>
+          <a:p>
+            <a:r>
+              <a:rPr lang="en-US" dirty="0"/>
+              <a:t>What Should Lists Keep Track Of?</a:t>
+            </a:r>
+          </a:p>
+        </p:txBody>
+      </p:sp>
+      <p:sp>
+        <p:nvSpPr>
+          <p:cNvPr id="3" name="Content Placeholder 2">
+            <a:extLst>
+              <a:ext uri="{FF2B5EF4-FFF2-40B4-BE49-F238E27FC236}">
+                <a16:creationId xmlns:a16="http://schemas.microsoft.com/office/drawing/2014/main" id="{A0A9670E-51FE-86F4-B2AB-9547B990D2B8}"/>
+              </a:ext>
+            </a:extLst>
+          </p:cNvPr>
+          <p:cNvSpPr>
+            <a:spLocks noGrp="1"/>
+          </p:cNvSpPr>
+          <p:nvPr>
+            <p:ph idx="1"/>
+          </p:nvPr>
+        </p:nvSpPr>
+        <p:spPr/>
+        <p:txBody>
+          <a:bodyPr/>
+          <a:lstStyle/>
+          <a:p>
+            <a:pPr marL="457200" indent="-457200">
+              <a:buAutoNum type="arabicPeriod"/>
+            </a:pPr>
+            <a:r>
+              <a:rPr lang="en-US" dirty="0"/>
+              <a:t>The type or size of each available menu item.  Examples: “Chicken”, “Medium”</a:t>
+            </a:r>
+          </a:p>
+          <a:p>
+            <a:pPr marL="457200" indent="-457200">
+              <a:buAutoNum type="arabicPeriod"/>
+            </a:pPr>
+            <a:r>
+              <a:rPr lang="en-US" dirty="0"/>
+              <a:t>The price of each available menu item. Examples: 2.50, 1.50.</a:t>
+            </a:r>
+          </a:p>
+          <a:p>
+            <a:pPr marL="457200" indent="-457200">
+              <a:buAutoNum type="arabicPeriod"/>
+            </a:pPr>
+            <a:r>
+              <a:rPr lang="en-US" dirty="0"/>
+              <a:t>Include super-size option if fries are ordered.  Probably a Yes/No question with follow up action.</a:t>
+            </a:r>
+          </a:p>
+          <a:p>
+            <a:pPr marL="457200" indent="-457200">
+              <a:buAutoNum type="arabicPeriod"/>
+            </a:pPr>
+            <a:r>
+              <a:rPr lang="en-US" dirty="0"/>
+              <a:t>Check for and apply discount for 3-item </a:t>
+            </a:r>
+            <a:r>
+              <a:rPr lang="en-US"/>
+              <a:t>combination order.</a:t>
+            </a:r>
+            <a:endParaRPr lang="en-US" dirty="0"/>
+          </a:p>
+          <a:p>
+            <a:pPr marL="457200" indent="-457200">
+              <a:buAutoNum type="arabicPeriod"/>
+            </a:pPr>
+            <a:r>
+              <a:rPr lang="en-US" dirty="0"/>
+              <a:t>Display details of the order, including type/size, price, any discount and final total</a:t>
+            </a:r>
+          </a:p>
+        </p:txBody>
+      </p:sp>
+    </p:spTree>
+    <p:extLst>
+      <p:ext uri="{BB962C8B-B14F-4D97-AF65-F5344CB8AC3E}">
+        <p14:creationId xmlns:p14="http://schemas.microsoft.com/office/powerpoint/2010/main" val="1485780660"/>
       </p:ext>
     </p:extLst>
   </p:cSld>
@@ -11324,26 +11466,6 @@
 </file>
 
 <file path=customXml/item2.xml><?xml version="1.0" encoding="utf-8"?>
-<p:properties xmlns:p="http://schemas.microsoft.com/office/2006/metadata/properties" xmlns:xsi="http://www.w3.org/2001/XMLSchema-instance" xmlns:pc="http://schemas.microsoft.com/office/infopath/2007/PartnerControls">
-  <documentManagement>
-    <_ip_UnifiedCompliancePolicyUIAction xmlns="http://schemas.microsoft.com/sharepoint/v3" xsi:nil="true"/>
-    <Image xmlns="71af3243-3dd4-4a8d-8c0d-dd76da1f02a5">
-      <Url xsi:nil="true"/>
-      <Description xsi:nil="true"/>
-    </Image>
-    <Status xmlns="71af3243-3dd4-4a8d-8c0d-dd76da1f02a5">Not started</Status>
-    <Background xmlns="71af3243-3dd4-4a8d-8c0d-dd76da1f02a5">false</Background>
-    <_ip_UnifiedCompliancePolicyProperties xmlns="http://schemas.microsoft.com/sharepoint/v3" xsi:nil="true"/>
-    <ImageTagsTaxHTField xmlns="71af3243-3dd4-4a8d-8c0d-dd76da1f02a5">
-      <Terms xmlns="http://schemas.microsoft.com/office/infopath/2007/PartnerControls"/>
-    </ImageTagsTaxHTField>
-    <TaxCatchAll xmlns="230e9df3-be65-4c73-a93b-d1236ebd677e" xsi:nil="true"/>
-    <MediaServiceKeyPoints xmlns="71af3243-3dd4-4a8d-8c0d-dd76da1f02a5" xsi:nil="true"/>
-  </documentManagement>
-</p:properties>
-</file>
-
-<file path=customXml/item3.xml><?xml version="1.0" encoding="utf-8"?>
 <ct:contentTypeSchema xmlns:ct="http://schemas.microsoft.com/office/2006/metadata/contentType" xmlns:ma="http://schemas.microsoft.com/office/2006/metadata/properties/metaAttributes" ct:_="" ma:_="" ma:contentTypeName="Document" ma:contentTypeID="0x01010079F111ED35F8CC479449609E8A0923A6" ma:contentTypeVersion="28" ma:contentTypeDescription="Create a new document." ma:contentTypeScope="" ma:versionID="60f5a4f2d2b0abadcf532d48ebf9cb71">
   <xsd:schema xmlns:xsd="http://www.w3.org/2001/XMLSchema" xmlns:xs="http://www.w3.org/2001/XMLSchema" xmlns:p="http://schemas.microsoft.com/office/2006/metadata/properties" xmlns:ns1="http://schemas.microsoft.com/sharepoint/v3" xmlns:ns2="71af3243-3dd4-4a8d-8c0d-dd76da1f02a5" xmlns:ns3="16c05727-aa75-4e4a-9b5f-8a80a1165891" xmlns:ns4="230e9df3-be65-4c73-a93b-d1236ebd677e" targetNamespace="http://schemas.microsoft.com/office/2006/metadata/properties" ma:root="true" ma:fieldsID="7dd78129e6a1811f84807ad11c651531" ns1:_="" ns2:_="" ns3:_="" ns4:_="">
     <xsd:import namespace="http://schemas.microsoft.com/sharepoint/v3"/>
@@ -11655,6 +11777,26 @@
 </ct:contentTypeSchema>
 </file>
 
+<file path=customXml/item3.xml><?xml version="1.0" encoding="utf-8"?>
+<p:properties xmlns:p="http://schemas.microsoft.com/office/2006/metadata/properties" xmlns:xsi="http://www.w3.org/2001/XMLSchema-instance" xmlns:pc="http://schemas.microsoft.com/office/infopath/2007/PartnerControls">
+  <documentManagement>
+    <_ip_UnifiedCompliancePolicyUIAction xmlns="http://schemas.microsoft.com/sharepoint/v3" xsi:nil="true"/>
+    <Image xmlns="71af3243-3dd4-4a8d-8c0d-dd76da1f02a5">
+      <Url xsi:nil="true"/>
+      <Description xsi:nil="true"/>
+    </Image>
+    <Status xmlns="71af3243-3dd4-4a8d-8c0d-dd76da1f02a5">Not started</Status>
+    <Background xmlns="71af3243-3dd4-4a8d-8c0d-dd76da1f02a5">false</Background>
+    <_ip_UnifiedCompliancePolicyProperties xmlns="http://schemas.microsoft.com/sharepoint/v3" xsi:nil="true"/>
+    <ImageTagsTaxHTField xmlns="71af3243-3dd4-4a8d-8c0d-dd76da1f02a5">
+      <Terms xmlns="http://schemas.microsoft.com/office/infopath/2007/PartnerControls"/>
+    </ImageTagsTaxHTField>
+    <TaxCatchAll xmlns="230e9df3-be65-4c73-a93b-d1236ebd677e" xsi:nil="true"/>
+    <MediaServiceKeyPoints xmlns="71af3243-3dd4-4a8d-8c0d-dd76da1f02a5" xsi:nil="true"/>
+  </documentManagement>
+</p:properties>
+</file>
+
 <file path=customXml/itemProps1.xml><?xml version="1.0" encoding="utf-8"?>
 <ds:datastoreItem xmlns:ds="http://schemas.openxmlformats.org/officeDocument/2006/customXml" ds:itemID="{4E60708A-6461-4D7F-883F-7E25D731D326}">
   <ds:schemaRefs>
@@ -11664,18 +11806,6 @@
 </file>
 
 <file path=customXml/itemProps2.xml><?xml version="1.0" encoding="utf-8"?>
-<ds:datastoreItem xmlns:ds="http://schemas.openxmlformats.org/officeDocument/2006/customXml" ds:itemID="{E130005B-6102-4F3C-A26F-485DF1BF9717}">
-  <ds:schemaRefs>
-    <ds:schemaRef ds:uri="http://schemas.microsoft.com/office/2006/metadata/properties"/>
-    <ds:schemaRef ds:uri="http://schemas.microsoft.com/office/infopath/2007/PartnerControls"/>
-    <ds:schemaRef ds:uri="http://schemas.microsoft.com/sharepoint/v3"/>
-    <ds:schemaRef ds:uri="71af3243-3dd4-4a8d-8c0d-dd76da1f02a5"/>
-    <ds:schemaRef ds:uri="230e9df3-be65-4c73-a93b-d1236ebd677e"/>
-  </ds:schemaRefs>
-</ds:datastoreItem>
-</file>
-
-<file path=customXml/itemProps3.xml><?xml version="1.0" encoding="utf-8"?>
 <ds:datastoreItem xmlns:ds="http://schemas.openxmlformats.org/officeDocument/2006/customXml" ds:itemID="{2BC90B52-91C7-4BE9-8AE0-180FFFE1100A}">
   <ds:schemaRefs>
     <ds:schemaRef ds:uri="http://schemas.microsoft.com/office/2006/metadata/contentType"/>
@@ -11696,6 +11826,18 @@
 </ds:datastoreItem>
 </file>
 
+<file path=customXml/itemProps3.xml><?xml version="1.0" encoding="utf-8"?>
+<ds:datastoreItem xmlns:ds="http://schemas.openxmlformats.org/officeDocument/2006/customXml" ds:itemID="{E130005B-6102-4F3C-A26F-485DF1BF9717}">
+  <ds:schemaRefs>
+    <ds:schemaRef ds:uri="http://schemas.microsoft.com/office/2006/metadata/properties"/>
+    <ds:schemaRef ds:uri="http://schemas.microsoft.com/office/infopath/2007/PartnerControls"/>
+    <ds:schemaRef ds:uri="http://schemas.microsoft.com/sharepoint/v3"/>
+    <ds:schemaRef ds:uri="71af3243-3dd4-4a8d-8c0d-dd76da1f02a5"/>
+    <ds:schemaRef ds:uri="230e9df3-be65-4c73-a93b-d1236ebd677e"/>
+  </ds:schemaRefs>
+</ds:datastoreItem>
+</file>
+
 <file path=docMetadata/LabelInfo.xml><?xml version="1.0" encoding="utf-8"?>
 <clbl:labelList xmlns:clbl="http://schemas.microsoft.com/office/2020/mipLabelMetadata"/>
 </file>
</xml_diff>

<commit_message>
create generic way to ask yes/no question
</commit_message>
<xml_diff>
--- a/Combo Menu with lists using python.pptx
+++ b/Combo Menu with lists using python.pptx
@@ -5,16 +5,20 @@
     <p:sldMasterId id="2147483648" r:id="rId4"/>
   </p:sldMasterIdLst>
   <p:notesMasterIdLst>
-    <p:notesMasterId r:id="rId9"/>
+    <p:notesMasterId r:id="rId13"/>
   </p:notesMasterIdLst>
   <p:handoutMasterIdLst>
-    <p:handoutMasterId r:id="rId10"/>
+    <p:handoutMasterId r:id="rId14"/>
   </p:handoutMasterIdLst>
   <p:sldIdLst>
     <p:sldId id="256" r:id="rId5"/>
     <p:sldId id="3849" r:id="rId6"/>
     <p:sldId id="3850" r:id="rId7"/>
     <p:sldId id="3851" r:id="rId8"/>
+    <p:sldId id="3852" r:id="rId9"/>
+    <p:sldId id="3853" r:id="rId10"/>
+    <p:sldId id="3854" r:id="rId11"/>
+    <p:sldId id="3855" r:id="rId12"/>
   </p:sldIdLst>
   <p:sldSz cx="12192000" cy="6858000"/>
   <p:notesSz cx="6858000" cy="9144000"/>
@@ -10616,6 +10620,674 @@
     <p:extLst>
       <p:ext uri="{BB962C8B-B14F-4D97-AF65-F5344CB8AC3E}">
         <p14:creationId xmlns:p14="http://schemas.microsoft.com/office/powerpoint/2010/main" val="1485780660"/>
+      </p:ext>
+    </p:extLst>
+  </p:cSld>
+  <p:clrMapOvr>
+    <a:masterClrMapping/>
+  </p:clrMapOvr>
+</p:sld>
+</file>
+
+<file path=ppt/slides/slide5.xml><?xml version="1.0" encoding="utf-8"?>
+<p:sld xmlns:a="http://schemas.openxmlformats.org/drawingml/2006/main" xmlns:r="http://schemas.openxmlformats.org/officeDocument/2006/relationships" xmlns:p="http://schemas.openxmlformats.org/presentationml/2006/main">
+  <p:cSld>
+    <p:spTree>
+      <p:nvGrpSpPr>
+        <p:cNvPr id="1" name="">
+          <a:extLst>
+            <a:ext uri="{FF2B5EF4-FFF2-40B4-BE49-F238E27FC236}">
+              <a16:creationId xmlns:a16="http://schemas.microsoft.com/office/drawing/2014/main" id="{A1CFECF7-2677-8950-5803-4AF5A2A3CEBB}"/>
+            </a:ext>
+          </a:extLst>
+        </p:cNvPr>
+        <p:cNvGrpSpPr/>
+        <p:nvPr/>
+      </p:nvGrpSpPr>
+      <p:grpSpPr>
+        <a:xfrm>
+          <a:off x="0" y="0"/>
+          <a:ext cx="0" cy="0"/>
+          <a:chOff x="0" y="0"/>
+          <a:chExt cx="0" cy="0"/>
+        </a:xfrm>
+      </p:grpSpPr>
+      <p:sp>
+        <p:nvSpPr>
+          <p:cNvPr id="2" name="Title 1">
+            <a:extLst>
+              <a:ext uri="{FF2B5EF4-FFF2-40B4-BE49-F238E27FC236}">
+                <a16:creationId xmlns:a16="http://schemas.microsoft.com/office/drawing/2014/main" id="{BAD0AE1A-3DFA-A10B-2F75-1F76428415A9}"/>
+              </a:ext>
+            </a:extLst>
+          </p:cNvPr>
+          <p:cNvSpPr>
+            <a:spLocks noGrp="1"/>
+          </p:cNvSpPr>
+          <p:nvPr>
+            <p:ph type="title"/>
+          </p:nvPr>
+        </p:nvSpPr>
+        <p:spPr/>
+        <p:txBody>
+          <a:bodyPr/>
+          <a:lstStyle/>
+          <a:p>
+            <a:r>
+              <a:rPr lang="en-US" dirty="0"/>
+              <a:t>How many lists and why?</a:t>
+            </a:r>
+          </a:p>
+        </p:txBody>
+      </p:sp>
+      <p:sp>
+        <p:nvSpPr>
+          <p:cNvPr id="3" name="Content Placeholder 2">
+            <a:extLst>
+              <a:ext uri="{FF2B5EF4-FFF2-40B4-BE49-F238E27FC236}">
+                <a16:creationId xmlns:a16="http://schemas.microsoft.com/office/drawing/2014/main" id="{85240A23-AF75-584A-CFD0-D6D5A2B14EE7}"/>
+              </a:ext>
+            </a:extLst>
+          </p:cNvPr>
+          <p:cNvSpPr>
+            <a:spLocks noGrp="1"/>
+          </p:cNvSpPr>
+          <p:nvPr>
+            <p:ph idx="1"/>
+          </p:nvPr>
+        </p:nvSpPr>
+        <p:spPr/>
+        <p:txBody>
+          <a:bodyPr>
+            <a:normAutofit lnSpcReduction="10000"/>
+          </a:bodyPr>
+          <a:lstStyle/>
+          <a:p>
+            <a:pPr marL="457200" indent="-457200">
+              <a:buAutoNum type="arabicPeriod"/>
+            </a:pPr>
+            <a:r>
+              <a:rPr lang="en-US" dirty="0"/>
+              <a:t>A list to keep track of everything important about an order.  Will contain a mix of strings and numbers.</a:t>
+            </a:r>
+            <a:br>
+              <a:rPr lang="en-US" dirty="0"/>
+            </a:br>
+            <a:br>
+              <a:rPr lang="en-US" dirty="0"/>
+            </a:br>
+            <a:r>
+              <a:rPr lang="en-US" i="1" dirty="0"/>
+              <a:t>order = []</a:t>
+            </a:r>
+            <a:endParaRPr lang="en-US" dirty="0"/>
+          </a:p>
+          <a:p>
+            <a:pPr marL="457200" indent="-457200">
+              <a:buAutoNum type="arabicPeriod"/>
+            </a:pPr>
+            <a:r>
+              <a:rPr lang="en-US" dirty="0"/>
+              <a:t>A list of menu item types/sizes.  These will all be strings.</a:t>
+            </a:r>
+            <a:br>
+              <a:rPr lang="en-US" dirty="0"/>
+            </a:br>
+            <a:br>
+              <a:rPr lang="en-US" dirty="0"/>
+            </a:br>
+            <a:r>
+              <a:rPr lang="en-US" dirty="0" err="1"/>
+              <a:t>d</a:t>
+            </a:r>
+            <a:r>
+              <a:rPr lang="en-US" i="1" dirty="0" err="1"/>
+              <a:t>escrs</a:t>
+            </a:r>
+            <a:r>
+              <a:rPr lang="en-US" i="1" dirty="0"/>
+              <a:t> = []</a:t>
+            </a:r>
+            <a:endParaRPr lang="en-US" dirty="0"/>
+          </a:p>
+          <a:p>
+            <a:pPr marL="457200" indent="-457200">
+              <a:buAutoNum type="arabicPeriod"/>
+            </a:pPr>
+            <a:r>
+              <a:rPr lang="en-US" dirty="0"/>
+              <a:t>A list of prices of each available menu item, in the same order as the list of types/sizes so that the index for the type/size can be used to find the corresponding price.</a:t>
+            </a:r>
+            <a:br>
+              <a:rPr lang="en-US" dirty="0"/>
+            </a:br>
+            <a:br>
+              <a:rPr lang="en-US" dirty="0"/>
+            </a:br>
+            <a:r>
+              <a:rPr lang="en-US" dirty="0"/>
+              <a:t>prices = []</a:t>
+            </a:r>
+          </a:p>
+          <a:p>
+            <a:endParaRPr lang="en-US" dirty="0"/>
+          </a:p>
+        </p:txBody>
+      </p:sp>
+    </p:spTree>
+    <p:extLst>
+      <p:ext uri="{BB962C8B-B14F-4D97-AF65-F5344CB8AC3E}">
+        <p14:creationId xmlns:p14="http://schemas.microsoft.com/office/powerpoint/2010/main" val="3139608856"/>
+      </p:ext>
+    </p:extLst>
+  </p:cSld>
+  <p:clrMapOvr>
+    <a:masterClrMapping/>
+  </p:clrMapOvr>
+</p:sld>
+</file>
+
+<file path=ppt/slides/slide6.xml><?xml version="1.0" encoding="utf-8"?>
+<p:sld xmlns:a="http://schemas.openxmlformats.org/drawingml/2006/main" xmlns:r="http://schemas.openxmlformats.org/officeDocument/2006/relationships" xmlns:p="http://schemas.openxmlformats.org/presentationml/2006/main">
+  <p:cSld>
+    <p:spTree>
+      <p:nvGrpSpPr>
+        <p:cNvPr id="1" name="">
+          <a:extLst>
+            <a:ext uri="{FF2B5EF4-FFF2-40B4-BE49-F238E27FC236}">
+              <a16:creationId xmlns:a16="http://schemas.microsoft.com/office/drawing/2014/main" id="{5D3558AA-2621-C469-F6C1-6288EF2EF8B3}"/>
+            </a:ext>
+          </a:extLst>
+        </p:cNvPr>
+        <p:cNvGrpSpPr/>
+        <p:nvPr/>
+      </p:nvGrpSpPr>
+      <p:grpSpPr>
+        <a:xfrm>
+          <a:off x="0" y="0"/>
+          <a:ext cx="0" cy="0"/>
+          <a:chOff x="0" y="0"/>
+          <a:chExt cx="0" cy="0"/>
+        </a:xfrm>
+      </p:grpSpPr>
+      <p:sp>
+        <p:nvSpPr>
+          <p:cNvPr id="2" name="Title 1">
+            <a:extLst>
+              <a:ext uri="{FF2B5EF4-FFF2-40B4-BE49-F238E27FC236}">
+                <a16:creationId xmlns:a16="http://schemas.microsoft.com/office/drawing/2014/main" id="{C6B68695-7E68-F0D1-3387-E8616C8F6361}"/>
+              </a:ext>
+            </a:extLst>
+          </p:cNvPr>
+          <p:cNvSpPr>
+            <a:spLocks noGrp="1"/>
+          </p:cNvSpPr>
+          <p:nvPr>
+            <p:ph type="title"/>
+          </p:nvPr>
+        </p:nvSpPr>
+        <p:spPr/>
+        <p:txBody>
+          <a:bodyPr/>
+          <a:lstStyle/>
+          <a:p>
+            <a:r>
+              <a:rPr lang="en-US" dirty="0"/>
+              <a:t>Avoiding Magic Numbers and Strings</a:t>
+            </a:r>
+            <a:br>
+              <a:rPr lang="en-US" dirty="0"/>
+            </a:br>
+            <a:endParaRPr lang="en-US" dirty="0"/>
+          </a:p>
+        </p:txBody>
+      </p:sp>
+      <p:sp>
+        <p:nvSpPr>
+          <p:cNvPr id="3" name="Content Placeholder 2">
+            <a:extLst>
+              <a:ext uri="{FF2B5EF4-FFF2-40B4-BE49-F238E27FC236}">
+                <a16:creationId xmlns:a16="http://schemas.microsoft.com/office/drawing/2014/main" id="{001B322E-DD47-0440-5119-43B1004B2BA8}"/>
+              </a:ext>
+            </a:extLst>
+          </p:cNvPr>
+          <p:cNvSpPr>
+            <a:spLocks noGrp="1"/>
+          </p:cNvSpPr>
+          <p:nvPr>
+            <p:ph idx="1"/>
+          </p:nvPr>
+        </p:nvSpPr>
+        <p:spPr/>
+        <p:txBody>
+          <a:bodyPr>
+            <a:normAutofit/>
+          </a:bodyPr>
+          <a:lstStyle/>
+          <a:p>
+            <a:r>
+              <a:rPr lang="en-US" dirty="0"/>
+              <a:t>We could do this:</a:t>
+            </a:r>
+          </a:p>
+          <a:p>
+            <a:r>
+              <a:rPr lang="en-US" i="1" dirty="0"/>
+              <a:t>	order[1] = “Chicken”</a:t>
+            </a:r>
+          </a:p>
+          <a:p>
+            <a:r>
+              <a:rPr lang="en-US" i="1" dirty="0"/>
+              <a:t>	</a:t>
+            </a:r>
+            <a:r>
+              <a:rPr lang="en-US" dirty="0"/>
+              <a:t>order[2] = 5.25</a:t>
+            </a:r>
+          </a:p>
+          <a:p>
+            <a:r>
+              <a:rPr lang="en-US" i="1" dirty="0"/>
+              <a:t>	order[0] = order[0] + 5.25</a:t>
+            </a:r>
+          </a:p>
+          <a:p>
+            <a:r>
+              <a:rPr lang="en-US" i="1" dirty="0"/>
+              <a:t>Issues:</a:t>
+            </a:r>
+          </a:p>
+          <a:p>
+            <a:pPr marL="342900" indent="-342900">
+              <a:buFont typeface="Arial" panose="020B0604020202020204" pitchFamily="34" charset="0"/>
+              <a:buChar char="•"/>
+            </a:pPr>
+            <a:r>
+              <a:rPr lang="en-US" i="1" dirty="0"/>
+              <a:t>Hard-coded positions like [1] and [0]  are “magic numbers” with no context to anyone other than the original developer.  Same for “Chicken” a “magic string”</a:t>
+            </a:r>
+          </a:p>
+          <a:p>
+            <a:pPr marL="342900" indent="-342900">
+              <a:buFont typeface="Arial" panose="020B0604020202020204" pitchFamily="34" charset="0"/>
+              <a:buChar char="•"/>
+            </a:pPr>
+            <a:r>
+              <a:rPr lang="en-US" i="1" dirty="0"/>
+              <a:t>Hard to spot all the places to change if the price of a chicken sandwich changes to $5.75</a:t>
+            </a:r>
+          </a:p>
+        </p:txBody>
+      </p:sp>
+    </p:spTree>
+    <p:extLst>
+      <p:ext uri="{BB962C8B-B14F-4D97-AF65-F5344CB8AC3E}">
+        <p14:creationId xmlns:p14="http://schemas.microsoft.com/office/powerpoint/2010/main" val="2314366060"/>
+      </p:ext>
+    </p:extLst>
+  </p:cSld>
+  <p:clrMapOvr>
+    <a:masterClrMapping/>
+  </p:clrMapOvr>
+</p:sld>
+</file>
+
+<file path=ppt/slides/slide7.xml><?xml version="1.0" encoding="utf-8"?>
+<p:sld xmlns:a="http://schemas.openxmlformats.org/drawingml/2006/main" xmlns:r="http://schemas.openxmlformats.org/officeDocument/2006/relationships" xmlns:p="http://schemas.openxmlformats.org/presentationml/2006/main">
+  <p:cSld>
+    <p:spTree>
+      <p:nvGrpSpPr>
+        <p:cNvPr id="1" name="">
+          <a:extLst>
+            <a:ext uri="{FF2B5EF4-FFF2-40B4-BE49-F238E27FC236}">
+              <a16:creationId xmlns:a16="http://schemas.microsoft.com/office/drawing/2014/main" id="{CE90A59B-22A6-6F15-E124-AC32AFDC6E68}"/>
+            </a:ext>
+          </a:extLst>
+        </p:cNvPr>
+        <p:cNvGrpSpPr/>
+        <p:nvPr/>
+      </p:nvGrpSpPr>
+      <p:grpSpPr>
+        <a:xfrm>
+          <a:off x="0" y="0"/>
+          <a:ext cx="0" cy="0"/>
+          <a:chOff x="0" y="0"/>
+          <a:chExt cx="0" cy="0"/>
+        </a:xfrm>
+      </p:grpSpPr>
+      <p:sp>
+        <p:nvSpPr>
+          <p:cNvPr id="2" name="Title 1">
+            <a:extLst>
+              <a:ext uri="{FF2B5EF4-FFF2-40B4-BE49-F238E27FC236}">
+                <a16:creationId xmlns:a16="http://schemas.microsoft.com/office/drawing/2014/main" id="{DAAFE054-1013-F962-F22C-4C2175597216}"/>
+              </a:ext>
+            </a:extLst>
+          </p:cNvPr>
+          <p:cNvSpPr>
+            <a:spLocks noGrp="1"/>
+          </p:cNvSpPr>
+          <p:nvPr>
+            <p:ph type="title"/>
+          </p:nvPr>
+        </p:nvSpPr>
+        <p:spPr/>
+        <p:txBody>
+          <a:bodyPr/>
+          <a:lstStyle/>
+          <a:p>
+            <a:r>
+              <a:rPr lang="en-US" dirty="0"/>
+              <a:t>Avoiding Magic Numbers and Strings</a:t>
+            </a:r>
+            <a:br>
+              <a:rPr lang="en-US" dirty="0"/>
+            </a:br>
+            <a:endParaRPr lang="en-US" dirty="0"/>
+          </a:p>
+        </p:txBody>
+      </p:sp>
+      <p:sp>
+        <p:nvSpPr>
+          <p:cNvPr id="3" name="Content Placeholder 2">
+            <a:extLst>
+              <a:ext uri="{FF2B5EF4-FFF2-40B4-BE49-F238E27FC236}">
+                <a16:creationId xmlns:a16="http://schemas.microsoft.com/office/drawing/2014/main" id="{78004B73-1275-6F60-D76D-79B5C3507567}"/>
+              </a:ext>
+            </a:extLst>
+          </p:cNvPr>
+          <p:cNvSpPr>
+            <a:spLocks noGrp="1"/>
+          </p:cNvSpPr>
+          <p:nvPr>
+            <p:ph idx="1"/>
+          </p:nvPr>
+        </p:nvSpPr>
+        <p:spPr/>
+        <p:txBody>
+          <a:bodyPr>
+            <a:normAutofit/>
+          </a:bodyPr>
+          <a:lstStyle/>
+          <a:p>
+            <a:r>
+              <a:rPr lang="en-US" dirty="0"/>
+              <a:t>Better, initially harder, better long-term maintainability:</a:t>
+            </a:r>
+          </a:p>
+          <a:p>
+            <a:r>
+              <a:rPr lang="en-US" sz="2000" i="1" dirty="0"/>
+              <a:t>order = []</a:t>
+            </a:r>
+          </a:p>
+          <a:p>
+            <a:pPr>
+              <a:lnSpc>
+                <a:spcPct val="100000"/>
+              </a:lnSpc>
+            </a:pPr>
+            <a:r>
+              <a:rPr lang="en-US" sz="2000" i="1" dirty="0"/>
+              <a:t>IDX_TOTAL_COST = 0</a:t>
+            </a:r>
+          </a:p>
+          <a:p>
+            <a:pPr>
+              <a:lnSpc>
+                <a:spcPct val="100000"/>
+              </a:lnSpc>
+            </a:pPr>
+            <a:r>
+              <a:rPr lang="en-US" sz="2000" i="1" dirty="0" err="1"/>
+              <a:t>order.append</a:t>
+            </a:r>
+            <a:r>
+              <a:rPr lang="en-US" sz="2000" i="1" dirty="0"/>
+              <a:t>(0)</a:t>
+            </a:r>
+          </a:p>
+          <a:p>
+            <a:pPr>
+              <a:lnSpc>
+                <a:spcPct val="100000"/>
+              </a:lnSpc>
+            </a:pPr>
+            <a:endParaRPr lang="en-US" sz="2000" i="1" dirty="0"/>
+          </a:p>
+          <a:p>
+            <a:pPr>
+              <a:lnSpc>
+                <a:spcPct val="100000"/>
+              </a:lnSpc>
+            </a:pPr>
+            <a:r>
+              <a:rPr lang="en-US" sz="2000" i="1" dirty="0"/>
+              <a:t>IDX_SANDWICH_TYPE = 1</a:t>
+            </a:r>
+          </a:p>
+          <a:p>
+            <a:pPr>
+              <a:lnSpc>
+                <a:spcPct val="100000"/>
+              </a:lnSpc>
+            </a:pPr>
+            <a:r>
+              <a:rPr lang="en-US" sz="2000" i="1" dirty="0" err="1"/>
+              <a:t>order.append</a:t>
+            </a:r>
+            <a:r>
+              <a:rPr lang="en-US" sz="2000" i="1" dirty="0"/>
+              <a:t>("None")</a:t>
+            </a:r>
+          </a:p>
+          <a:p>
+            <a:pPr>
+              <a:lnSpc>
+                <a:spcPct val="100000"/>
+              </a:lnSpc>
+            </a:pPr>
+            <a:endParaRPr lang="en-US" sz="2000" i="1" dirty="0"/>
+          </a:p>
+          <a:p>
+            <a:pPr>
+              <a:lnSpc>
+                <a:spcPct val="100000"/>
+              </a:lnSpc>
+            </a:pPr>
+            <a:r>
+              <a:rPr lang="en-US" sz="2000" i="1" dirty="0"/>
+              <a:t>IDX_SANDWICH_COST = 2</a:t>
+            </a:r>
+          </a:p>
+          <a:p>
+            <a:pPr>
+              <a:lnSpc>
+                <a:spcPct val="100000"/>
+              </a:lnSpc>
+            </a:pPr>
+            <a:r>
+              <a:rPr lang="en-US" sz="2000" i="1" dirty="0" err="1"/>
+              <a:t>order.append</a:t>
+            </a:r>
+            <a:r>
+              <a:rPr lang="en-US" sz="2000" i="1" dirty="0"/>
+              <a:t>(0)</a:t>
+            </a:r>
+          </a:p>
+        </p:txBody>
+      </p:sp>
+    </p:spTree>
+    <p:extLst>
+      <p:ext uri="{BB962C8B-B14F-4D97-AF65-F5344CB8AC3E}">
+        <p14:creationId xmlns:p14="http://schemas.microsoft.com/office/powerpoint/2010/main" val="2394487167"/>
+      </p:ext>
+    </p:extLst>
+  </p:cSld>
+  <p:clrMapOvr>
+    <a:masterClrMapping/>
+  </p:clrMapOvr>
+</p:sld>
+</file>
+
+<file path=ppt/slides/slide8.xml><?xml version="1.0" encoding="utf-8"?>
+<p:sld xmlns:a="http://schemas.openxmlformats.org/drawingml/2006/main" xmlns:r="http://schemas.openxmlformats.org/officeDocument/2006/relationships" xmlns:p="http://schemas.openxmlformats.org/presentationml/2006/main">
+  <p:cSld>
+    <p:spTree>
+      <p:nvGrpSpPr>
+        <p:cNvPr id="1" name="">
+          <a:extLst>
+            <a:ext uri="{FF2B5EF4-FFF2-40B4-BE49-F238E27FC236}">
+              <a16:creationId xmlns:a16="http://schemas.microsoft.com/office/drawing/2014/main" id="{47500EE9-F2A8-3F01-FB27-ACE18BF30EEF}"/>
+            </a:ext>
+          </a:extLst>
+        </p:cNvPr>
+        <p:cNvGrpSpPr/>
+        <p:nvPr/>
+      </p:nvGrpSpPr>
+      <p:grpSpPr>
+        <a:xfrm>
+          <a:off x="0" y="0"/>
+          <a:ext cx="0" cy="0"/>
+          <a:chOff x="0" y="0"/>
+          <a:chExt cx="0" cy="0"/>
+        </a:xfrm>
+      </p:grpSpPr>
+      <p:sp>
+        <p:nvSpPr>
+          <p:cNvPr id="2" name="Title 1">
+            <a:extLst>
+              <a:ext uri="{FF2B5EF4-FFF2-40B4-BE49-F238E27FC236}">
+                <a16:creationId xmlns:a16="http://schemas.microsoft.com/office/drawing/2014/main" id="{B545509E-D41C-3091-3AB1-970B0176D2E6}"/>
+              </a:ext>
+            </a:extLst>
+          </p:cNvPr>
+          <p:cNvSpPr>
+            <a:spLocks noGrp="1"/>
+          </p:cNvSpPr>
+          <p:nvPr>
+            <p:ph type="title"/>
+          </p:nvPr>
+        </p:nvSpPr>
+        <p:spPr/>
+        <p:txBody>
+          <a:bodyPr/>
+          <a:lstStyle/>
+          <a:p>
+            <a:r>
+              <a:rPr lang="en-US" dirty="0"/>
+              <a:t>Avoiding Magic Numbers and Strings</a:t>
+            </a:r>
+            <a:br>
+              <a:rPr lang="en-US" dirty="0"/>
+            </a:br>
+            <a:endParaRPr lang="en-US" dirty="0"/>
+          </a:p>
+        </p:txBody>
+      </p:sp>
+      <p:sp>
+        <p:nvSpPr>
+          <p:cNvPr id="3" name="Content Placeholder 2">
+            <a:extLst>
+              <a:ext uri="{FF2B5EF4-FFF2-40B4-BE49-F238E27FC236}">
+                <a16:creationId xmlns:a16="http://schemas.microsoft.com/office/drawing/2014/main" id="{C060E5DF-756D-CE43-A2B0-2BFE8AEF7505}"/>
+              </a:ext>
+            </a:extLst>
+          </p:cNvPr>
+          <p:cNvSpPr>
+            <a:spLocks noGrp="1"/>
+          </p:cNvSpPr>
+          <p:nvPr>
+            <p:ph idx="1"/>
+          </p:nvPr>
+        </p:nvSpPr>
+        <p:spPr/>
+        <p:txBody>
+          <a:bodyPr>
+            <a:normAutofit/>
+          </a:bodyPr>
+          <a:lstStyle/>
+          <a:p>
+            <a:r>
+              <a:rPr lang="en-US" dirty="0"/>
+              <a:t>Better, initially harder, better long-term maintainability:</a:t>
+            </a:r>
+          </a:p>
+          <a:p>
+            <a:r>
+              <a:rPr lang="en-US" sz="2000" i="1" dirty="0" err="1"/>
+              <a:t>descrs</a:t>
+            </a:r>
+            <a:r>
+              <a:rPr lang="en-US" sz="2000" i="1" dirty="0"/>
+              <a:t> = []</a:t>
+            </a:r>
+          </a:p>
+          <a:p>
+            <a:r>
+              <a:rPr lang="en-US" sz="2000" i="1" dirty="0"/>
+              <a:t>prices = []</a:t>
+            </a:r>
+          </a:p>
+          <a:p>
+            <a:r>
+              <a:rPr lang="en-US" sz="2000" i="1" dirty="0"/>
+              <a:t>IDX_SANDWICH_CHICKEN = 0</a:t>
+            </a:r>
+          </a:p>
+          <a:p>
+            <a:r>
+              <a:rPr lang="en-US" sz="2000" i="1" dirty="0" err="1"/>
+              <a:t>descrs.append</a:t>
+            </a:r>
+            <a:r>
+              <a:rPr lang="en-US" sz="2000" i="1" dirty="0"/>
+              <a:t>('Chicken')</a:t>
+            </a:r>
+          </a:p>
+          <a:p>
+            <a:r>
+              <a:rPr lang="en-US" sz="2000" i="1" dirty="0" err="1"/>
+              <a:t>prices.append</a:t>
+            </a:r>
+            <a:r>
+              <a:rPr lang="en-US" sz="2000" i="1" dirty="0"/>
+              <a:t>(5.25)</a:t>
+            </a:r>
+          </a:p>
+          <a:p>
+            <a:r>
+              <a:rPr lang="en-US" sz="2000" i="1" dirty="0"/>
+              <a:t>This allows:</a:t>
+            </a:r>
+          </a:p>
+          <a:p>
+            <a:r>
+              <a:rPr lang="en-US" sz="2000" i="1" dirty="0"/>
+              <a:t>order[IDX_SANDWICH_TYPE] = </a:t>
+            </a:r>
+            <a:r>
+              <a:rPr lang="en-US" sz="2000" i="1" dirty="0" err="1"/>
+              <a:t>descrs</a:t>
+            </a:r>
+            <a:r>
+              <a:rPr lang="en-US" sz="2000" i="1" dirty="0"/>
+              <a:t>[IDX_SANDWICH_CHICKEN]</a:t>
+            </a:r>
+          </a:p>
+          <a:p>
+            <a:r>
+              <a:rPr lang="en-US" sz="2000" i="1" dirty="0"/>
+              <a:t>Order[IDX_SANDWICH_COST] = prices[IDX_SANDWICH_CHICKEN]</a:t>
+            </a:r>
+          </a:p>
+        </p:txBody>
+      </p:sp>
+    </p:spTree>
+    <p:extLst>
+      <p:ext uri="{BB962C8B-B14F-4D97-AF65-F5344CB8AC3E}">
+        <p14:creationId xmlns:p14="http://schemas.microsoft.com/office/powerpoint/2010/main" val="1147512877"/>
       </p:ext>
     </p:extLst>
   </p:cSld>
@@ -11466,6 +12138,26 @@
 </file>
 
 <file path=customXml/item2.xml><?xml version="1.0" encoding="utf-8"?>
+<p:properties xmlns:p="http://schemas.microsoft.com/office/2006/metadata/properties" xmlns:xsi="http://www.w3.org/2001/XMLSchema-instance" xmlns:pc="http://schemas.microsoft.com/office/infopath/2007/PartnerControls">
+  <documentManagement>
+    <_ip_UnifiedCompliancePolicyUIAction xmlns="http://schemas.microsoft.com/sharepoint/v3" xsi:nil="true"/>
+    <Image xmlns="71af3243-3dd4-4a8d-8c0d-dd76da1f02a5">
+      <Url xsi:nil="true"/>
+      <Description xsi:nil="true"/>
+    </Image>
+    <Status xmlns="71af3243-3dd4-4a8d-8c0d-dd76da1f02a5">Not started</Status>
+    <Background xmlns="71af3243-3dd4-4a8d-8c0d-dd76da1f02a5">false</Background>
+    <_ip_UnifiedCompliancePolicyProperties xmlns="http://schemas.microsoft.com/sharepoint/v3" xsi:nil="true"/>
+    <ImageTagsTaxHTField xmlns="71af3243-3dd4-4a8d-8c0d-dd76da1f02a5">
+      <Terms xmlns="http://schemas.microsoft.com/office/infopath/2007/PartnerControls"/>
+    </ImageTagsTaxHTField>
+    <TaxCatchAll xmlns="230e9df3-be65-4c73-a93b-d1236ebd677e" xsi:nil="true"/>
+    <MediaServiceKeyPoints xmlns="71af3243-3dd4-4a8d-8c0d-dd76da1f02a5" xsi:nil="true"/>
+  </documentManagement>
+</p:properties>
+</file>
+
+<file path=customXml/item3.xml><?xml version="1.0" encoding="utf-8"?>
 <ct:contentTypeSchema xmlns:ct="http://schemas.microsoft.com/office/2006/metadata/contentType" xmlns:ma="http://schemas.microsoft.com/office/2006/metadata/properties/metaAttributes" ct:_="" ma:_="" ma:contentTypeName="Document" ma:contentTypeID="0x01010079F111ED35F8CC479449609E8A0923A6" ma:contentTypeVersion="28" ma:contentTypeDescription="Create a new document." ma:contentTypeScope="" ma:versionID="60f5a4f2d2b0abadcf532d48ebf9cb71">
   <xsd:schema xmlns:xsd="http://www.w3.org/2001/XMLSchema" xmlns:xs="http://www.w3.org/2001/XMLSchema" xmlns:p="http://schemas.microsoft.com/office/2006/metadata/properties" xmlns:ns1="http://schemas.microsoft.com/sharepoint/v3" xmlns:ns2="71af3243-3dd4-4a8d-8c0d-dd76da1f02a5" xmlns:ns3="16c05727-aa75-4e4a-9b5f-8a80a1165891" xmlns:ns4="230e9df3-be65-4c73-a93b-d1236ebd677e" targetNamespace="http://schemas.microsoft.com/office/2006/metadata/properties" ma:root="true" ma:fieldsID="7dd78129e6a1811f84807ad11c651531" ns1:_="" ns2:_="" ns3:_="" ns4:_="">
     <xsd:import namespace="http://schemas.microsoft.com/sharepoint/v3"/>
@@ -11777,26 +12469,6 @@
 </ct:contentTypeSchema>
 </file>
 
-<file path=customXml/item3.xml><?xml version="1.0" encoding="utf-8"?>
-<p:properties xmlns:p="http://schemas.microsoft.com/office/2006/metadata/properties" xmlns:xsi="http://www.w3.org/2001/XMLSchema-instance" xmlns:pc="http://schemas.microsoft.com/office/infopath/2007/PartnerControls">
-  <documentManagement>
-    <_ip_UnifiedCompliancePolicyUIAction xmlns="http://schemas.microsoft.com/sharepoint/v3" xsi:nil="true"/>
-    <Image xmlns="71af3243-3dd4-4a8d-8c0d-dd76da1f02a5">
-      <Url xsi:nil="true"/>
-      <Description xsi:nil="true"/>
-    </Image>
-    <Status xmlns="71af3243-3dd4-4a8d-8c0d-dd76da1f02a5">Not started</Status>
-    <Background xmlns="71af3243-3dd4-4a8d-8c0d-dd76da1f02a5">false</Background>
-    <_ip_UnifiedCompliancePolicyProperties xmlns="http://schemas.microsoft.com/sharepoint/v3" xsi:nil="true"/>
-    <ImageTagsTaxHTField xmlns="71af3243-3dd4-4a8d-8c0d-dd76da1f02a5">
-      <Terms xmlns="http://schemas.microsoft.com/office/infopath/2007/PartnerControls"/>
-    </ImageTagsTaxHTField>
-    <TaxCatchAll xmlns="230e9df3-be65-4c73-a93b-d1236ebd677e" xsi:nil="true"/>
-    <MediaServiceKeyPoints xmlns="71af3243-3dd4-4a8d-8c0d-dd76da1f02a5" xsi:nil="true"/>
-  </documentManagement>
-</p:properties>
-</file>
-
 <file path=customXml/itemProps1.xml><?xml version="1.0" encoding="utf-8"?>
 <ds:datastoreItem xmlns:ds="http://schemas.openxmlformats.org/officeDocument/2006/customXml" ds:itemID="{4E60708A-6461-4D7F-883F-7E25D731D326}">
   <ds:schemaRefs>
@@ -11806,6 +12478,18 @@
 </file>
 
 <file path=customXml/itemProps2.xml><?xml version="1.0" encoding="utf-8"?>
+<ds:datastoreItem xmlns:ds="http://schemas.openxmlformats.org/officeDocument/2006/customXml" ds:itemID="{E130005B-6102-4F3C-A26F-485DF1BF9717}">
+  <ds:schemaRefs>
+    <ds:schemaRef ds:uri="http://schemas.microsoft.com/office/2006/metadata/properties"/>
+    <ds:schemaRef ds:uri="http://schemas.microsoft.com/office/infopath/2007/PartnerControls"/>
+    <ds:schemaRef ds:uri="http://schemas.microsoft.com/sharepoint/v3"/>
+    <ds:schemaRef ds:uri="71af3243-3dd4-4a8d-8c0d-dd76da1f02a5"/>
+    <ds:schemaRef ds:uri="230e9df3-be65-4c73-a93b-d1236ebd677e"/>
+  </ds:schemaRefs>
+</ds:datastoreItem>
+</file>
+
+<file path=customXml/itemProps3.xml><?xml version="1.0" encoding="utf-8"?>
 <ds:datastoreItem xmlns:ds="http://schemas.openxmlformats.org/officeDocument/2006/customXml" ds:itemID="{2BC90B52-91C7-4BE9-8AE0-180FFFE1100A}">
   <ds:schemaRefs>
     <ds:schemaRef ds:uri="http://schemas.microsoft.com/office/2006/metadata/contentType"/>
@@ -11826,18 +12510,6 @@
 </ds:datastoreItem>
 </file>
 
-<file path=customXml/itemProps3.xml><?xml version="1.0" encoding="utf-8"?>
-<ds:datastoreItem xmlns:ds="http://schemas.openxmlformats.org/officeDocument/2006/customXml" ds:itemID="{E130005B-6102-4F3C-A26F-485DF1BF9717}">
-  <ds:schemaRefs>
-    <ds:schemaRef ds:uri="http://schemas.microsoft.com/office/2006/metadata/properties"/>
-    <ds:schemaRef ds:uri="http://schemas.microsoft.com/office/infopath/2007/PartnerControls"/>
-    <ds:schemaRef ds:uri="http://schemas.microsoft.com/sharepoint/v3"/>
-    <ds:schemaRef ds:uri="71af3243-3dd4-4a8d-8c0d-dd76da1f02a5"/>
-    <ds:schemaRef ds:uri="230e9df3-be65-4c73-a93b-d1236ebd677e"/>
-  </ds:schemaRefs>
-</ds:datastoreItem>
-</file>
-
 <file path=docMetadata/LabelInfo.xml><?xml version="1.0" encoding="utf-8"?>
 <clbl:labelList xmlns:clbl="http://schemas.microsoft.com/office/2020/mipLabelMetadata"/>
 </file>
</xml_diff>